<commit_message>
I changed the powerpoint for the project section review your experience
</commit_message>
<xml_diff>
--- a/powerpoint/Akatsuki-Website-Presentation.pptx
+++ b/powerpoint/Akatsuki-Website-Presentation.pptx
@@ -12,7 +12,15 @@
     <p:sldId id="260" r:id="rId6"/>
     <p:sldId id="261" r:id="rId7"/>
     <p:sldId id="262" r:id="rId8"/>
-    <p:sldId id="263" r:id="rId9"/>
+    <p:sldId id="264" r:id="rId9"/>
+    <p:sldId id="265" r:id="rId10"/>
+    <p:sldId id="266" r:id="rId11"/>
+    <p:sldId id="267" r:id="rId12"/>
+    <p:sldId id="268" r:id="rId13"/>
+    <p:sldId id="269" r:id="rId14"/>
+    <p:sldId id="270" r:id="rId15"/>
+    <p:sldId id="271" r:id="rId16"/>
+    <p:sldId id="263" r:id="rId17"/>
   </p:sldIdLst>
   <p:sldSz cx="9144000" cy="6858000" type="screen4x3"/>
   <p:notesSz cx="6858000" cy="9144000"/>
@@ -309,7 +317,7 @@
           <a:p>
             <a:fld id="{5BCAD085-E8A6-8845-BD4E-CB4CCA059FC4}" type="datetimeFigureOut">
               <a:rPr lang="en-US" smtClean="0"/>
-              <a:t>6/12/2025</a:t>
+              <a:t>6/13/2025</a:t>
             </a:fld>
             <a:endParaRPr lang="en-US"/>
           </a:p>
@@ -477,7 +485,7 @@
           <a:p>
             <a:fld id="{5BCAD085-E8A6-8845-BD4E-CB4CCA059FC4}" type="datetimeFigureOut">
               <a:rPr lang="en-US" smtClean="0"/>
-              <a:t>6/12/2025</a:t>
+              <a:t>6/13/2025</a:t>
             </a:fld>
             <a:endParaRPr lang="en-US"/>
           </a:p>
@@ -655,7 +663,7 @@
           <a:p>
             <a:fld id="{5BCAD085-E8A6-8845-BD4E-CB4CCA059FC4}" type="datetimeFigureOut">
               <a:rPr lang="en-US" smtClean="0"/>
-              <a:t>6/12/2025</a:t>
+              <a:t>6/13/2025</a:t>
             </a:fld>
             <a:endParaRPr lang="en-US"/>
           </a:p>
@@ -823,7 +831,7 @@
           <a:p>
             <a:fld id="{5BCAD085-E8A6-8845-BD4E-CB4CCA059FC4}" type="datetimeFigureOut">
               <a:rPr lang="en-US" smtClean="0"/>
-              <a:t>6/12/2025</a:t>
+              <a:t>6/13/2025</a:t>
             </a:fld>
             <a:endParaRPr lang="en-US"/>
           </a:p>
@@ -1068,7 +1076,7 @@
           <a:p>
             <a:fld id="{5BCAD085-E8A6-8845-BD4E-CB4CCA059FC4}" type="datetimeFigureOut">
               <a:rPr lang="en-US" smtClean="0"/>
-              <a:t>6/12/2025</a:t>
+              <a:t>6/13/2025</a:t>
             </a:fld>
             <a:endParaRPr lang="en-US"/>
           </a:p>
@@ -1353,7 +1361,7 @@
           <a:p>
             <a:fld id="{5BCAD085-E8A6-8845-BD4E-CB4CCA059FC4}" type="datetimeFigureOut">
               <a:rPr lang="en-US" smtClean="0"/>
-              <a:t>6/12/2025</a:t>
+              <a:t>6/13/2025</a:t>
             </a:fld>
             <a:endParaRPr lang="en-US"/>
           </a:p>
@@ -1772,7 +1780,7 @@
           <a:p>
             <a:fld id="{5BCAD085-E8A6-8845-BD4E-CB4CCA059FC4}" type="datetimeFigureOut">
               <a:rPr lang="en-US" smtClean="0"/>
-              <a:t>6/12/2025</a:t>
+              <a:t>6/13/2025</a:t>
             </a:fld>
             <a:endParaRPr lang="en-US"/>
           </a:p>
@@ -1889,7 +1897,7 @@
           <a:p>
             <a:fld id="{5BCAD085-E8A6-8845-BD4E-CB4CCA059FC4}" type="datetimeFigureOut">
               <a:rPr lang="en-US" smtClean="0"/>
-              <a:t>6/12/2025</a:t>
+              <a:t>6/13/2025</a:t>
             </a:fld>
             <a:endParaRPr lang="en-US"/>
           </a:p>
@@ -1984,7 +1992,7 @@
           <a:p>
             <a:fld id="{5BCAD085-E8A6-8845-BD4E-CB4CCA059FC4}" type="datetimeFigureOut">
               <a:rPr lang="en-US" smtClean="0"/>
-              <a:t>6/12/2025</a:t>
+              <a:t>6/13/2025</a:t>
             </a:fld>
             <a:endParaRPr lang="en-US"/>
           </a:p>
@@ -2259,7 +2267,7 @@
           <a:p>
             <a:fld id="{5BCAD085-E8A6-8845-BD4E-CB4CCA059FC4}" type="datetimeFigureOut">
               <a:rPr lang="en-US" smtClean="0"/>
-              <a:t>6/12/2025</a:t>
+              <a:t>6/13/2025</a:t>
             </a:fld>
             <a:endParaRPr lang="en-US"/>
           </a:p>
@@ -2511,7 +2519,7 @@
           <a:p>
             <a:fld id="{5BCAD085-E8A6-8845-BD4E-CB4CCA059FC4}" type="datetimeFigureOut">
               <a:rPr lang="en-US" smtClean="0"/>
-              <a:t>6/12/2025</a:t>
+              <a:t>6/13/2025</a:t>
             </a:fld>
             <a:endParaRPr lang="en-US"/>
           </a:p>
@@ -2722,7 +2730,7 @@
           <a:p>
             <a:fld id="{5BCAD085-E8A6-8845-BD4E-CB4CCA059FC4}" type="datetimeFigureOut">
               <a:rPr lang="en-US" smtClean="0"/>
-              <a:t>6/12/2025</a:t>
+              <a:t>6/13/2025</a:t>
             </a:fld>
             <a:endParaRPr lang="en-US"/>
           </a:p>
@@ -3163,6 +3171,676 @@
 </p:sld>
 </file>
 
+<file path=ppt/slides/slide10.xml><?xml version="1.0" encoding="utf-8"?>
+<p:sld xmlns:a="http://schemas.openxmlformats.org/drawingml/2006/main" xmlns:r="http://schemas.openxmlformats.org/officeDocument/2006/relationships" xmlns:p="http://schemas.openxmlformats.org/presentationml/2006/main">
+  <p:cSld>
+    <p:spTree>
+      <p:nvGrpSpPr>
+        <p:cNvPr id="1" name=""/>
+        <p:cNvGrpSpPr/>
+        <p:nvPr/>
+      </p:nvGrpSpPr>
+      <p:grpSpPr>
+        <a:xfrm>
+          <a:off x="0" y="0"/>
+          <a:ext cx="0" cy="0"/>
+          <a:chOff x="0" y="0"/>
+          <a:chExt cx="0" cy="0"/>
+        </a:xfrm>
+      </p:grpSpPr>
+      <p:sp>
+        <p:nvSpPr>
+          <p:cNvPr id="2" name="Titel 1">
+            <a:extLst>
+              <a:ext uri="{FF2B5EF4-FFF2-40B4-BE49-F238E27FC236}">
+                <a16:creationId xmlns:a16="http://schemas.microsoft.com/office/drawing/2014/main" id="{62E33CE5-535F-42C7-9DEB-A4B7C6CE4679}"/>
+              </a:ext>
+            </a:extLst>
+          </p:cNvPr>
+          <p:cNvSpPr>
+            <a:spLocks noGrp="1"/>
+          </p:cNvSpPr>
+          <p:nvPr>
+            <p:ph type="title"/>
+          </p:nvPr>
+        </p:nvSpPr>
+        <p:spPr/>
+        <p:txBody>
+          <a:bodyPr/>
+          <a:lstStyle/>
+          <a:p>
+            <a:r>
+              <a:rPr lang="nl-NL" dirty="0"/>
+              <a:t>Website </a:t>
+            </a:r>
+            <a:r>
+              <a:rPr lang="nl-NL" dirty="0" err="1"/>
+              <a:t>layout</a:t>
+            </a:r>
+            <a:endParaRPr lang="nl-NL" dirty="0"/>
+          </a:p>
+        </p:txBody>
+      </p:sp>
+      <p:pic>
+        <p:nvPicPr>
+          <p:cNvPr id="5" name="Tijdelijke aanduiding voor inhoud 4">
+            <a:extLst>
+              <a:ext uri="{FF2B5EF4-FFF2-40B4-BE49-F238E27FC236}">
+                <a16:creationId xmlns:a16="http://schemas.microsoft.com/office/drawing/2014/main" id="{9A81CBCF-C1B0-4049-AC2F-66BEFD7A01F3}"/>
+              </a:ext>
+            </a:extLst>
+          </p:cNvPr>
+          <p:cNvPicPr>
+            <a:picLocks noGrp="1" noChangeAspect="1"/>
+          </p:cNvPicPr>
+          <p:nvPr>
+            <p:ph idx="1"/>
+          </p:nvPr>
+        </p:nvPicPr>
+        <p:blipFill>
+          <a:blip r:embed="rId2"/>
+          <a:stretch>
+            <a:fillRect/>
+          </a:stretch>
+        </p:blipFill>
+        <p:spPr>
+          <a:xfrm>
+            <a:off x="457200" y="1831935"/>
+            <a:ext cx="8229600" cy="4062493"/>
+          </a:xfrm>
+        </p:spPr>
+      </p:pic>
+    </p:spTree>
+    <p:extLst>
+      <p:ext uri="{BB962C8B-B14F-4D97-AF65-F5344CB8AC3E}">
+        <p14:creationId xmlns:p14="http://schemas.microsoft.com/office/powerpoint/2010/main" val="2461014440"/>
+      </p:ext>
+    </p:extLst>
+  </p:cSld>
+  <p:clrMapOvr>
+    <a:masterClrMapping/>
+  </p:clrMapOvr>
+</p:sld>
+</file>
+
+<file path=ppt/slides/slide11.xml><?xml version="1.0" encoding="utf-8"?>
+<p:sld xmlns:a="http://schemas.openxmlformats.org/drawingml/2006/main" xmlns:r="http://schemas.openxmlformats.org/officeDocument/2006/relationships" xmlns:p="http://schemas.openxmlformats.org/presentationml/2006/main">
+  <p:cSld>
+    <p:spTree>
+      <p:nvGrpSpPr>
+        <p:cNvPr id="1" name=""/>
+        <p:cNvGrpSpPr/>
+        <p:nvPr/>
+      </p:nvGrpSpPr>
+      <p:grpSpPr>
+        <a:xfrm>
+          <a:off x="0" y="0"/>
+          <a:ext cx="0" cy="0"/>
+          <a:chOff x="0" y="0"/>
+          <a:chExt cx="0" cy="0"/>
+        </a:xfrm>
+      </p:grpSpPr>
+      <p:sp>
+        <p:nvSpPr>
+          <p:cNvPr id="2" name="Titel 1">
+            <a:extLst>
+              <a:ext uri="{FF2B5EF4-FFF2-40B4-BE49-F238E27FC236}">
+                <a16:creationId xmlns:a16="http://schemas.microsoft.com/office/drawing/2014/main" id="{5350B250-A23A-48AA-9411-9301F997BE24}"/>
+              </a:ext>
+            </a:extLst>
+          </p:cNvPr>
+          <p:cNvSpPr>
+            <a:spLocks noGrp="1"/>
+          </p:cNvSpPr>
+          <p:nvPr>
+            <p:ph type="title"/>
+          </p:nvPr>
+        </p:nvSpPr>
+        <p:spPr/>
+        <p:txBody>
+          <a:bodyPr/>
+          <a:lstStyle/>
+          <a:p>
+            <a:r>
+              <a:rPr lang="nl-NL" dirty="0"/>
+              <a:t>Website </a:t>
+            </a:r>
+            <a:r>
+              <a:rPr lang="nl-NL" dirty="0" err="1"/>
+              <a:t>layout</a:t>
+            </a:r>
+            <a:endParaRPr lang="nl-NL" dirty="0"/>
+          </a:p>
+        </p:txBody>
+      </p:sp>
+      <p:pic>
+        <p:nvPicPr>
+          <p:cNvPr id="5" name="Tijdelijke aanduiding voor inhoud 4">
+            <a:extLst>
+              <a:ext uri="{FF2B5EF4-FFF2-40B4-BE49-F238E27FC236}">
+                <a16:creationId xmlns:a16="http://schemas.microsoft.com/office/drawing/2014/main" id="{B3885E5A-34E2-44B9-83B2-4C18CC888B0E}"/>
+              </a:ext>
+            </a:extLst>
+          </p:cNvPr>
+          <p:cNvPicPr>
+            <a:picLocks noGrp="1" noChangeAspect="1"/>
+          </p:cNvPicPr>
+          <p:nvPr>
+            <p:ph idx="1"/>
+          </p:nvPr>
+        </p:nvPicPr>
+        <p:blipFill>
+          <a:blip r:embed="rId2"/>
+          <a:stretch>
+            <a:fillRect/>
+          </a:stretch>
+        </p:blipFill>
+        <p:spPr>
+          <a:xfrm>
+            <a:off x="457200" y="1849876"/>
+            <a:ext cx="8229600" cy="4026610"/>
+          </a:xfrm>
+        </p:spPr>
+      </p:pic>
+    </p:spTree>
+    <p:extLst>
+      <p:ext uri="{BB962C8B-B14F-4D97-AF65-F5344CB8AC3E}">
+        <p14:creationId xmlns:p14="http://schemas.microsoft.com/office/powerpoint/2010/main" val="225081688"/>
+      </p:ext>
+    </p:extLst>
+  </p:cSld>
+  <p:clrMapOvr>
+    <a:masterClrMapping/>
+  </p:clrMapOvr>
+</p:sld>
+</file>
+
+<file path=ppt/slides/slide12.xml><?xml version="1.0" encoding="utf-8"?>
+<p:sld xmlns:a="http://schemas.openxmlformats.org/drawingml/2006/main" xmlns:r="http://schemas.openxmlformats.org/officeDocument/2006/relationships" xmlns:p="http://schemas.openxmlformats.org/presentationml/2006/main">
+  <p:cSld>
+    <p:spTree>
+      <p:nvGrpSpPr>
+        <p:cNvPr id="1" name=""/>
+        <p:cNvGrpSpPr/>
+        <p:nvPr/>
+      </p:nvGrpSpPr>
+      <p:grpSpPr>
+        <a:xfrm>
+          <a:off x="0" y="0"/>
+          <a:ext cx="0" cy="0"/>
+          <a:chOff x="0" y="0"/>
+          <a:chExt cx="0" cy="0"/>
+        </a:xfrm>
+      </p:grpSpPr>
+      <p:sp>
+        <p:nvSpPr>
+          <p:cNvPr id="2" name="Titel 1">
+            <a:extLst>
+              <a:ext uri="{FF2B5EF4-FFF2-40B4-BE49-F238E27FC236}">
+                <a16:creationId xmlns:a16="http://schemas.microsoft.com/office/drawing/2014/main" id="{3E5DDD79-09E9-4394-B4B7-216AFDA6CC0C}"/>
+              </a:ext>
+            </a:extLst>
+          </p:cNvPr>
+          <p:cNvSpPr>
+            <a:spLocks noGrp="1"/>
+          </p:cNvSpPr>
+          <p:nvPr>
+            <p:ph type="title"/>
+          </p:nvPr>
+        </p:nvSpPr>
+        <p:spPr/>
+        <p:txBody>
+          <a:bodyPr/>
+          <a:lstStyle/>
+          <a:p>
+            <a:r>
+              <a:rPr lang="nl-NL" dirty="0"/>
+              <a:t>Website </a:t>
+            </a:r>
+            <a:r>
+              <a:rPr lang="nl-NL" dirty="0" err="1"/>
+              <a:t>layout</a:t>
+            </a:r>
+            <a:endParaRPr lang="nl-NL" dirty="0"/>
+          </a:p>
+        </p:txBody>
+      </p:sp>
+      <p:pic>
+        <p:nvPicPr>
+          <p:cNvPr id="5" name="Tijdelijke aanduiding voor inhoud 4">
+            <a:extLst>
+              <a:ext uri="{FF2B5EF4-FFF2-40B4-BE49-F238E27FC236}">
+                <a16:creationId xmlns:a16="http://schemas.microsoft.com/office/drawing/2014/main" id="{5FC3DFF2-975E-4314-9E4B-5D4617894071}"/>
+              </a:ext>
+            </a:extLst>
+          </p:cNvPr>
+          <p:cNvPicPr>
+            <a:picLocks noGrp="1" noChangeAspect="1"/>
+          </p:cNvPicPr>
+          <p:nvPr>
+            <p:ph idx="1"/>
+          </p:nvPr>
+        </p:nvPicPr>
+        <p:blipFill>
+          <a:blip r:embed="rId2"/>
+          <a:stretch>
+            <a:fillRect/>
+          </a:stretch>
+        </p:blipFill>
+        <p:spPr>
+          <a:xfrm>
+            <a:off x="457200" y="1886201"/>
+            <a:ext cx="8229600" cy="3953961"/>
+          </a:xfrm>
+        </p:spPr>
+      </p:pic>
+    </p:spTree>
+    <p:extLst>
+      <p:ext uri="{BB962C8B-B14F-4D97-AF65-F5344CB8AC3E}">
+        <p14:creationId xmlns:p14="http://schemas.microsoft.com/office/powerpoint/2010/main" val="3897340890"/>
+      </p:ext>
+    </p:extLst>
+  </p:cSld>
+  <p:clrMapOvr>
+    <a:masterClrMapping/>
+  </p:clrMapOvr>
+</p:sld>
+</file>
+
+<file path=ppt/slides/slide13.xml><?xml version="1.0" encoding="utf-8"?>
+<p:sld xmlns:a="http://schemas.openxmlformats.org/drawingml/2006/main" xmlns:r="http://schemas.openxmlformats.org/officeDocument/2006/relationships" xmlns:p="http://schemas.openxmlformats.org/presentationml/2006/main">
+  <p:cSld>
+    <p:spTree>
+      <p:nvGrpSpPr>
+        <p:cNvPr id="1" name=""/>
+        <p:cNvGrpSpPr/>
+        <p:nvPr/>
+      </p:nvGrpSpPr>
+      <p:grpSpPr>
+        <a:xfrm>
+          <a:off x="0" y="0"/>
+          <a:ext cx="0" cy="0"/>
+          <a:chOff x="0" y="0"/>
+          <a:chExt cx="0" cy="0"/>
+        </a:xfrm>
+      </p:grpSpPr>
+      <p:sp>
+        <p:nvSpPr>
+          <p:cNvPr id="2" name="Titel 1">
+            <a:extLst>
+              <a:ext uri="{FF2B5EF4-FFF2-40B4-BE49-F238E27FC236}">
+                <a16:creationId xmlns:a16="http://schemas.microsoft.com/office/drawing/2014/main" id="{011BD592-6287-41B4-B211-219C06985156}"/>
+              </a:ext>
+            </a:extLst>
+          </p:cNvPr>
+          <p:cNvSpPr>
+            <a:spLocks noGrp="1"/>
+          </p:cNvSpPr>
+          <p:nvPr>
+            <p:ph type="title"/>
+          </p:nvPr>
+        </p:nvSpPr>
+        <p:spPr/>
+        <p:txBody>
+          <a:bodyPr/>
+          <a:lstStyle/>
+          <a:p>
+            <a:r>
+              <a:rPr lang="nl-NL" dirty="0"/>
+              <a:t>Website </a:t>
+            </a:r>
+            <a:r>
+              <a:rPr lang="nl-NL" dirty="0" err="1"/>
+              <a:t>layout</a:t>
+            </a:r>
+            <a:endParaRPr lang="nl-NL" dirty="0"/>
+          </a:p>
+        </p:txBody>
+      </p:sp>
+      <p:pic>
+        <p:nvPicPr>
+          <p:cNvPr id="5" name="Tijdelijke aanduiding voor inhoud 4">
+            <a:extLst>
+              <a:ext uri="{FF2B5EF4-FFF2-40B4-BE49-F238E27FC236}">
+                <a16:creationId xmlns:a16="http://schemas.microsoft.com/office/drawing/2014/main" id="{9FE277D0-A3CF-4D93-B3E2-F8412D735F45}"/>
+              </a:ext>
+            </a:extLst>
+          </p:cNvPr>
+          <p:cNvPicPr>
+            <a:picLocks noGrp="1" noChangeAspect="1"/>
+          </p:cNvPicPr>
+          <p:nvPr>
+            <p:ph idx="1"/>
+          </p:nvPr>
+        </p:nvPicPr>
+        <p:blipFill>
+          <a:blip r:embed="rId2"/>
+          <a:stretch>
+            <a:fillRect/>
+          </a:stretch>
+        </p:blipFill>
+        <p:spPr>
+          <a:xfrm>
+            <a:off x="457200" y="1873147"/>
+            <a:ext cx="8229600" cy="3980069"/>
+          </a:xfrm>
+        </p:spPr>
+      </p:pic>
+    </p:spTree>
+    <p:extLst>
+      <p:ext uri="{BB962C8B-B14F-4D97-AF65-F5344CB8AC3E}">
+        <p14:creationId xmlns:p14="http://schemas.microsoft.com/office/powerpoint/2010/main" val="2631423421"/>
+      </p:ext>
+    </p:extLst>
+  </p:cSld>
+  <p:clrMapOvr>
+    <a:masterClrMapping/>
+  </p:clrMapOvr>
+</p:sld>
+</file>
+
+<file path=ppt/slides/slide14.xml><?xml version="1.0" encoding="utf-8"?>
+<p:sld xmlns:a="http://schemas.openxmlformats.org/drawingml/2006/main" xmlns:r="http://schemas.openxmlformats.org/officeDocument/2006/relationships" xmlns:p="http://schemas.openxmlformats.org/presentationml/2006/main">
+  <p:cSld>
+    <p:spTree>
+      <p:nvGrpSpPr>
+        <p:cNvPr id="1" name=""/>
+        <p:cNvGrpSpPr/>
+        <p:nvPr/>
+      </p:nvGrpSpPr>
+      <p:grpSpPr>
+        <a:xfrm>
+          <a:off x="0" y="0"/>
+          <a:ext cx="0" cy="0"/>
+          <a:chOff x="0" y="0"/>
+          <a:chExt cx="0" cy="0"/>
+        </a:xfrm>
+      </p:grpSpPr>
+      <p:sp>
+        <p:nvSpPr>
+          <p:cNvPr id="2" name="Titel 1">
+            <a:extLst>
+              <a:ext uri="{FF2B5EF4-FFF2-40B4-BE49-F238E27FC236}">
+                <a16:creationId xmlns:a16="http://schemas.microsoft.com/office/drawing/2014/main" id="{4DD8A6DE-6670-4D08-9FE4-32FFB18C44DC}"/>
+              </a:ext>
+            </a:extLst>
+          </p:cNvPr>
+          <p:cNvSpPr>
+            <a:spLocks noGrp="1"/>
+          </p:cNvSpPr>
+          <p:nvPr>
+            <p:ph type="title"/>
+          </p:nvPr>
+        </p:nvSpPr>
+        <p:spPr/>
+        <p:txBody>
+          <a:bodyPr/>
+          <a:lstStyle/>
+          <a:p>
+            <a:r>
+              <a:rPr lang="nl-NL" dirty="0"/>
+              <a:t>Website </a:t>
+            </a:r>
+            <a:r>
+              <a:rPr lang="nl-NL" dirty="0" err="1"/>
+              <a:t>layout</a:t>
+            </a:r>
+            <a:endParaRPr lang="nl-NL" dirty="0"/>
+          </a:p>
+        </p:txBody>
+      </p:sp>
+      <p:pic>
+        <p:nvPicPr>
+          <p:cNvPr id="5" name="Tijdelijke aanduiding voor inhoud 4">
+            <a:extLst>
+              <a:ext uri="{FF2B5EF4-FFF2-40B4-BE49-F238E27FC236}">
+                <a16:creationId xmlns:a16="http://schemas.microsoft.com/office/drawing/2014/main" id="{5BBAF475-794C-4585-9519-B29AC1510B47}"/>
+              </a:ext>
+            </a:extLst>
+          </p:cNvPr>
+          <p:cNvPicPr>
+            <a:picLocks noGrp="1" noChangeAspect="1"/>
+          </p:cNvPicPr>
+          <p:nvPr>
+            <p:ph idx="1"/>
+          </p:nvPr>
+        </p:nvPicPr>
+        <p:blipFill>
+          <a:blip r:embed="rId2"/>
+          <a:stretch>
+            <a:fillRect/>
+          </a:stretch>
+        </p:blipFill>
+        <p:spPr>
+          <a:xfrm>
+            <a:off x="457200" y="1827762"/>
+            <a:ext cx="8229600" cy="4070838"/>
+          </a:xfrm>
+        </p:spPr>
+      </p:pic>
+    </p:spTree>
+    <p:extLst>
+      <p:ext uri="{BB962C8B-B14F-4D97-AF65-F5344CB8AC3E}">
+        <p14:creationId xmlns:p14="http://schemas.microsoft.com/office/powerpoint/2010/main" val="2413286701"/>
+      </p:ext>
+    </p:extLst>
+  </p:cSld>
+  <p:clrMapOvr>
+    <a:masterClrMapping/>
+  </p:clrMapOvr>
+</p:sld>
+</file>
+
+<file path=ppt/slides/slide15.xml><?xml version="1.0" encoding="utf-8"?>
+<p:sld xmlns:a="http://schemas.openxmlformats.org/drawingml/2006/main" xmlns:r="http://schemas.openxmlformats.org/officeDocument/2006/relationships" xmlns:p="http://schemas.openxmlformats.org/presentationml/2006/main">
+  <p:cSld>
+    <p:spTree>
+      <p:nvGrpSpPr>
+        <p:cNvPr id="1" name=""/>
+        <p:cNvGrpSpPr/>
+        <p:nvPr/>
+      </p:nvGrpSpPr>
+      <p:grpSpPr>
+        <a:xfrm>
+          <a:off x="0" y="0"/>
+          <a:ext cx="0" cy="0"/>
+          <a:chOff x="0" y="0"/>
+          <a:chExt cx="0" cy="0"/>
+        </a:xfrm>
+      </p:grpSpPr>
+      <p:sp>
+        <p:nvSpPr>
+          <p:cNvPr id="2" name="Titel 1">
+            <a:extLst>
+              <a:ext uri="{FF2B5EF4-FFF2-40B4-BE49-F238E27FC236}">
+                <a16:creationId xmlns:a16="http://schemas.microsoft.com/office/drawing/2014/main" id="{84FDFA31-18C5-45C2-8C83-747298EFADC7}"/>
+              </a:ext>
+            </a:extLst>
+          </p:cNvPr>
+          <p:cNvSpPr>
+            <a:spLocks noGrp="1"/>
+          </p:cNvSpPr>
+          <p:nvPr>
+            <p:ph type="title"/>
+          </p:nvPr>
+        </p:nvSpPr>
+        <p:spPr/>
+        <p:txBody>
+          <a:bodyPr/>
+          <a:lstStyle/>
+          <a:p>
+            <a:r>
+              <a:rPr lang="nl-NL" dirty="0"/>
+              <a:t>Website </a:t>
+            </a:r>
+            <a:r>
+              <a:rPr lang="nl-NL" dirty="0" err="1"/>
+              <a:t>layout</a:t>
+            </a:r>
+            <a:endParaRPr lang="nl-NL" dirty="0"/>
+          </a:p>
+        </p:txBody>
+      </p:sp>
+      <p:pic>
+        <p:nvPicPr>
+          <p:cNvPr id="5" name="Tijdelijke aanduiding voor inhoud 4">
+            <a:extLst>
+              <a:ext uri="{FF2B5EF4-FFF2-40B4-BE49-F238E27FC236}">
+                <a16:creationId xmlns:a16="http://schemas.microsoft.com/office/drawing/2014/main" id="{BBF945F6-13D1-4A65-BE9F-C7B066BB2B55}"/>
+              </a:ext>
+            </a:extLst>
+          </p:cNvPr>
+          <p:cNvPicPr>
+            <a:picLocks noGrp="1" noChangeAspect="1"/>
+          </p:cNvPicPr>
+          <p:nvPr>
+            <p:ph idx="1"/>
+          </p:nvPr>
+        </p:nvPicPr>
+        <p:blipFill>
+          <a:blip r:embed="rId2"/>
+          <a:stretch>
+            <a:fillRect/>
+          </a:stretch>
+        </p:blipFill>
+        <p:spPr>
+          <a:xfrm>
+            <a:off x="457200" y="1883044"/>
+            <a:ext cx="8229600" cy="3960274"/>
+          </a:xfrm>
+        </p:spPr>
+      </p:pic>
+    </p:spTree>
+    <p:extLst>
+      <p:ext uri="{BB962C8B-B14F-4D97-AF65-F5344CB8AC3E}">
+        <p14:creationId xmlns:p14="http://schemas.microsoft.com/office/powerpoint/2010/main" val="3267706725"/>
+      </p:ext>
+    </p:extLst>
+  </p:cSld>
+  <p:clrMapOvr>
+    <a:masterClrMapping/>
+  </p:clrMapOvr>
+</p:sld>
+</file>
+
+<file path=ppt/slides/slide16.xml><?xml version="1.0" encoding="utf-8"?>
+<p:sld xmlns:a="http://schemas.openxmlformats.org/drawingml/2006/main" xmlns:r="http://schemas.openxmlformats.org/officeDocument/2006/relationships" xmlns:p="http://schemas.openxmlformats.org/presentationml/2006/main">
+  <p:cSld>
+    <p:bg>
+      <p:bgPr>
+        <a:solidFill>
+          <a:srgbClr val="000000"/>
+        </a:solidFill>
+        <a:effectLst/>
+      </p:bgPr>
+    </p:bg>
+    <p:spTree>
+      <p:nvGrpSpPr>
+        <p:cNvPr id="1" name=""/>
+        <p:cNvGrpSpPr/>
+        <p:nvPr/>
+      </p:nvGrpSpPr>
+      <p:grpSpPr>
+        <a:xfrm>
+          <a:off x="0" y="0"/>
+          <a:ext cx="0" cy="0"/>
+          <a:chOff x="0" y="0"/>
+          <a:chExt cx="0" cy="0"/>
+        </a:xfrm>
+      </p:grpSpPr>
+      <p:sp>
+        <p:nvSpPr>
+          <p:cNvPr id="2" name="Title 1"/>
+          <p:cNvSpPr>
+            <a:spLocks noGrp="1"/>
+          </p:cNvSpPr>
+          <p:nvPr>
+            <p:ph type="title"/>
+          </p:nvPr>
+        </p:nvSpPr>
+        <p:spPr/>
+        <p:txBody>
+          <a:bodyPr/>
+          <a:lstStyle/>
+          <a:p>
+            <a:r>
+              <a:rPr>
+                <a:solidFill>
+                  <a:srgbClr val="FFFFFF"/>
+                </a:solidFill>
+              </a:rPr>
+              <a:t>Thank You for Watching!</a:t>
+            </a:r>
+          </a:p>
+        </p:txBody>
+      </p:sp>
+      <p:sp>
+        <p:nvSpPr>
+          <p:cNvPr id="3" name="Content Placeholder 2"/>
+          <p:cNvSpPr>
+            <a:spLocks noGrp="1"/>
+          </p:cNvSpPr>
+          <p:nvPr>
+            <p:ph idx="1"/>
+          </p:nvPr>
+        </p:nvSpPr>
+        <p:spPr/>
+        <p:txBody>
+          <a:bodyPr/>
+          <a:lstStyle/>
+          <a:p>
+            <a:r>
+              <a:rPr dirty="0">
+                <a:solidFill>
+                  <a:srgbClr val="FFFFFF"/>
+                </a:solidFill>
+              </a:rPr>
+              <a:t>• Any questions about the website’s functionality?</a:t>
+            </a:r>
+          </a:p>
+          <a:p>
+            <a:r>
+              <a:rPr dirty="0">
+                <a:solidFill>
+                  <a:srgbClr val="FFFFFF"/>
+                </a:solidFill>
+              </a:rPr>
+              <a:t>• We're happy to explain.</a:t>
+            </a:r>
+          </a:p>
+          <a:p>
+            <a:r>
+              <a:rPr dirty="0">
+                <a:solidFill>
+                  <a:srgbClr val="FFFFFF"/>
+                </a:solidFill>
+              </a:rPr>
+              <a:t>• Contact us at: </a:t>
+            </a:r>
+            <a:r>
+              <a:rPr lang="nl-NL" dirty="0">
+                <a:solidFill>
+                  <a:srgbClr val="FFFFFF"/>
+                </a:solidFill>
+              </a:rPr>
+              <a:t>mustafa.khedoe7@outlook.com</a:t>
+            </a:r>
+            <a:endParaRPr dirty="0">
+              <a:solidFill>
+                <a:srgbClr val="FFFFFF"/>
+              </a:solidFill>
+            </a:endParaRPr>
+          </a:p>
+        </p:txBody>
+      </p:sp>
+    </p:spTree>
+  </p:cSld>
+  <p:clrMapOvr>
+    <a:masterClrMapping/>
+  </p:clrMapOvr>
+</p:sld>
+</file>
+
 <file path=ppt/slides/slide2.xml><?xml version="1.0" encoding="utf-8"?>
 <p:sld xmlns:a="http://schemas.openxmlformats.org/drawingml/2006/main" xmlns:r="http://schemas.openxmlformats.org/officeDocument/2006/relationships" xmlns:p="http://schemas.openxmlformats.org/presentationml/2006/main">
   <p:cSld>
@@ -3226,7 +3904,9 @@
         </p:nvSpPr>
         <p:spPr/>
         <p:txBody>
-          <a:bodyPr/>
+          <a:bodyPr>
+            <a:normAutofit lnSpcReduction="10000"/>
+          </a:bodyPr>
           <a:lstStyle/>
           <a:p>
             <a:r>
@@ -3706,14 +4386,6 @@
 <file path=ppt/slides/slide8.xml><?xml version="1.0" encoding="utf-8"?>
 <p:sld xmlns:a="http://schemas.openxmlformats.org/drawingml/2006/main" xmlns:r="http://schemas.openxmlformats.org/officeDocument/2006/relationships" xmlns:p="http://schemas.openxmlformats.org/presentationml/2006/main">
   <p:cSld>
-    <p:bg>
-      <p:bgPr>
-        <a:solidFill>
-          <a:srgbClr val="000000"/>
-        </a:solidFill>
-        <a:effectLst/>
-      </p:bgPr>
-    </p:bg>
     <p:spTree>
       <p:nvGrpSpPr>
         <p:cNvPr id="1" name=""/>
@@ -3730,7 +4402,13 @@
       </p:grpSpPr>
       <p:sp>
         <p:nvSpPr>
-          <p:cNvPr id="2" name="Title 1"/>
+          <p:cNvPr id="2" name="Titel 1">
+            <a:extLst>
+              <a:ext uri="{FF2B5EF4-FFF2-40B4-BE49-F238E27FC236}">
+                <a16:creationId xmlns:a16="http://schemas.microsoft.com/office/drawing/2014/main" id="{F93EC4D2-67C1-4C7E-B824-96EAF43083FF}"/>
+              </a:ext>
+            </a:extLst>
+          </p:cNvPr>
           <p:cNvSpPr>
             <a:spLocks noGrp="1"/>
           </p:cNvSpPr>
@@ -3744,76 +4422,144 @@
           <a:lstStyle/>
           <a:p>
             <a:r>
-              <a:rPr>
-                <a:solidFill>
-                  <a:srgbClr val="FFFFFF"/>
-                </a:solidFill>
-              </a:rPr>
-              <a:t>Thank You for Watching!</a:t>
-            </a:r>
-          </a:p>
-        </p:txBody>
-      </p:sp>
-      <p:sp>
-        <p:nvSpPr>
-          <p:cNvPr id="3" name="Content Placeholder 2"/>
-          <p:cNvSpPr>
-            <a:spLocks noGrp="1"/>
-          </p:cNvSpPr>
+              <a:rPr lang="nl-NL" dirty="0"/>
+              <a:t>Website </a:t>
+            </a:r>
+            <a:r>
+              <a:rPr lang="nl-NL" dirty="0" err="1"/>
+              <a:t>layout</a:t>
+            </a:r>
+            <a:endParaRPr lang="nl-NL" dirty="0"/>
+          </a:p>
+        </p:txBody>
+      </p:sp>
+      <p:pic>
+        <p:nvPicPr>
+          <p:cNvPr id="5" name="Tijdelijke aanduiding voor inhoud 4">
+            <a:extLst>
+              <a:ext uri="{FF2B5EF4-FFF2-40B4-BE49-F238E27FC236}">
+                <a16:creationId xmlns:a16="http://schemas.microsoft.com/office/drawing/2014/main" id="{65E5AB93-2B22-4272-9230-D979C1368D82}"/>
+              </a:ext>
+            </a:extLst>
+          </p:cNvPr>
+          <p:cNvPicPr>
+            <a:picLocks noGrp="1" noChangeAspect="1"/>
+          </p:cNvPicPr>
           <p:nvPr>
             <p:ph idx="1"/>
           </p:nvPr>
-        </p:nvSpPr>
-        <p:spPr/>
-        <p:txBody>
-          <a:bodyPr/>
-          <a:lstStyle/>
-          <a:p>
-            <a:r>
-              <a:rPr dirty="0">
-                <a:solidFill>
-                  <a:srgbClr val="FFFFFF"/>
-                </a:solidFill>
-              </a:rPr>
-              <a:t>• Any questions about the website’s functionality?</a:t>
-            </a:r>
-          </a:p>
-          <a:p>
-            <a:r>
-              <a:rPr dirty="0">
-                <a:solidFill>
-                  <a:srgbClr val="FFFFFF"/>
-                </a:solidFill>
-              </a:rPr>
-              <a:t>• We're happy to explain.</a:t>
-            </a:r>
-          </a:p>
-          <a:p>
-            <a:r>
-              <a:rPr dirty="0">
-                <a:solidFill>
-                  <a:srgbClr val="FFFFFF"/>
-                </a:solidFill>
-              </a:rPr>
-              <a:t>• Contact us at: </a:t>
-            </a:r>
-            <a:r>
-              <a:rPr lang="nl-NL" dirty="0">
-                <a:solidFill>
-                  <a:srgbClr val="FFFFFF"/>
-                </a:solidFill>
-              </a:rPr>
-              <a:t>mustafa.khedoe7@outlook.com</a:t>
-            </a:r>
-            <a:endParaRPr dirty="0">
-              <a:solidFill>
-                <a:srgbClr val="FFFFFF"/>
-              </a:solidFill>
-            </a:endParaRPr>
-          </a:p>
-        </p:txBody>
-      </p:sp>
+        </p:nvPicPr>
+        <p:blipFill>
+          <a:blip r:embed="rId2"/>
+          <a:stretch>
+            <a:fillRect/>
+          </a:stretch>
+        </p:blipFill>
+        <p:spPr>
+          <a:xfrm>
+            <a:off x="457200" y="1819896"/>
+            <a:ext cx="8229600" cy="4086571"/>
+          </a:xfrm>
+        </p:spPr>
+      </p:pic>
     </p:spTree>
+    <p:extLst>
+      <p:ext uri="{BB962C8B-B14F-4D97-AF65-F5344CB8AC3E}">
+        <p14:creationId xmlns:p14="http://schemas.microsoft.com/office/powerpoint/2010/main" val="2506501159"/>
+      </p:ext>
+    </p:extLst>
+  </p:cSld>
+  <p:clrMapOvr>
+    <a:masterClrMapping/>
+  </p:clrMapOvr>
+</p:sld>
+</file>
+
+<file path=ppt/slides/slide9.xml><?xml version="1.0" encoding="utf-8"?>
+<p:sld xmlns:a="http://schemas.openxmlformats.org/drawingml/2006/main" xmlns:r="http://schemas.openxmlformats.org/officeDocument/2006/relationships" xmlns:p="http://schemas.openxmlformats.org/presentationml/2006/main">
+  <p:cSld>
+    <p:spTree>
+      <p:nvGrpSpPr>
+        <p:cNvPr id="1" name=""/>
+        <p:cNvGrpSpPr/>
+        <p:nvPr/>
+      </p:nvGrpSpPr>
+      <p:grpSpPr>
+        <a:xfrm>
+          <a:off x="0" y="0"/>
+          <a:ext cx="0" cy="0"/>
+          <a:chOff x="0" y="0"/>
+          <a:chExt cx="0" cy="0"/>
+        </a:xfrm>
+      </p:grpSpPr>
+      <p:sp>
+        <p:nvSpPr>
+          <p:cNvPr id="2" name="Titel 1">
+            <a:extLst>
+              <a:ext uri="{FF2B5EF4-FFF2-40B4-BE49-F238E27FC236}">
+                <a16:creationId xmlns:a16="http://schemas.microsoft.com/office/drawing/2014/main" id="{2665FFC1-3325-422C-A7DA-F9FCDE2BA128}"/>
+              </a:ext>
+            </a:extLst>
+          </p:cNvPr>
+          <p:cNvSpPr>
+            <a:spLocks noGrp="1"/>
+          </p:cNvSpPr>
+          <p:nvPr>
+            <p:ph type="title"/>
+          </p:nvPr>
+        </p:nvSpPr>
+        <p:spPr/>
+        <p:txBody>
+          <a:bodyPr/>
+          <a:lstStyle/>
+          <a:p>
+            <a:r>
+              <a:rPr lang="nl-NL" dirty="0"/>
+              <a:t>Website </a:t>
+            </a:r>
+            <a:r>
+              <a:rPr lang="nl-NL" dirty="0" err="1"/>
+              <a:t>layout</a:t>
+            </a:r>
+            <a:endParaRPr lang="nl-NL" dirty="0"/>
+          </a:p>
+        </p:txBody>
+      </p:sp>
+      <p:pic>
+        <p:nvPicPr>
+          <p:cNvPr id="5" name="Tijdelijke aanduiding voor inhoud 4">
+            <a:extLst>
+              <a:ext uri="{FF2B5EF4-FFF2-40B4-BE49-F238E27FC236}">
+                <a16:creationId xmlns:a16="http://schemas.microsoft.com/office/drawing/2014/main" id="{A84344A1-8957-43AE-8A2C-42527AC25C3B}"/>
+              </a:ext>
+            </a:extLst>
+          </p:cNvPr>
+          <p:cNvPicPr>
+            <a:picLocks noGrp="1" noChangeAspect="1"/>
+          </p:cNvPicPr>
+          <p:nvPr>
+            <p:ph idx="1"/>
+          </p:nvPr>
+        </p:nvPicPr>
+        <p:blipFill>
+          <a:blip r:embed="rId2"/>
+          <a:stretch>
+            <a:fillRect/>
+          </a:stretch>
+        </p:blipFill>
+        <p:spPr>
+          <a:xfrm>
+            <a:off x="457200" y="1826388"/>
+            <a:ext cx="8229600" cy="4073586"/>
+          </a:xfrm>
+        </p:spPr>
+      </p:pic>
+    </p:spTree>
+    <p:extLst>
+      <p:ext uri="{BB962C8B-B14F-4D97-AF65-F5344CB8AC3E}">
+        <p14:creationId xmlns:p14="http://schemas.microsoft.com/office/powerpoint/2010/main" val="1594496494"/>
+      </p:ext>
+    </p:extLst>
   </p:cSld>
   <p:clrMapOvr>
     <a:masterClrMapping/>

</xml_diff>